<commit_message>
Adding link and animations
</commit_message>
<xml_diff>
--- a/The Impact Of Social Media On Students.pptx
+++ b/The Impact Of Social Media On Students.pptx
@@ -10,6 +10,7 @@
     <p:sldId id="258" r:id="rId4"/>
     <p:sldId id="259" r:id="rId5"/>
     <p:sldId id="260" r:id="rId6"/>
+    <p:sldId id="262" r:id="rId7"/>
   </p:sldIdLst>
   <p:sldSz cx="12192000" cy="6858000"/>
   <p:notesSz cx="6858000" cy="9144000"/>
@@ -108,6 +109,11 @@
       </a:defRPr>
     </a:lvl9pPr>
   </p:defaultTextStyle>
+  <p:extLst>
+    <p:ext uri="{EFAFB233-063F-42B5-8137-9DF3F51BA10A}">
+      <p15:sldGuideLst xmlns:p15="http://schemas.microsoft.com/office/powerpoint/2012/main"/>
+    </p:ext>
+  </p:extLst>
 </p:presentation>
 </file>
 
@@ -222,6 +228,11 @@
               </a:ln>
               <a:effectLst/>
             </c:spPr>
+            <c:extLst>
+              <c:ext xmlns:c16="http://schemas.microsoft.com/office/drawing/2014/chart" uri="{C3380CC4-5D6E-409C-BE32-E72D297353CC}">
+                <c16:uniqueId val="{00000001-4B27-439B-9CBD-9801A4E605C4}"/>
+              </c:ext>
+            </c:extLst>
           </c:dPt>
           <c:dPt>
             <c:idx val="1"/>
@@ -237,6 +248,11 @@
               </a:ln>
               <a:effectLst/>
             </c:spPr>
+            <c:extLst>
+              <c:ext xmlns:c16="http://schemas.microsoft.com/office/drawing/2014/chart" uri="{C3380CC4-5D6E-409C-BE32-E72D297353CC}">
+                <c16:uniqueId val="{00000003-4B27-439B-9CBD-9801A4E605C4}"/>
+              </c:ext>
+            </c:extLst>
           </c:dPt>
           <c:dPt>
             <c:idx val="2"/>
@@ -252,6 +268,11 @@
               </a:ln>
               <a:effectLst/>
             </c:spPr>
+            <c:extLst>
+              <c:ext xmlns:c16="http://schemas.microsoft.com/office/drawing/2014/chart" uri="{C3380CC4-5D6E-409C-BE32-E72D297353CC}">
+                <c16:uniqueId val="{00000005-4B27-439B-9CBD-9801A4E605C4}"/>
+              </c:ext>
+            </c:extLst>
           </c:dPt>
           <c:dPt>
             <c:idx val="3"/>
@@ -267,6 +288,11 @@
               </a:ln>
               <a:effectLst/>
             </c:spPr>
+            <c:extLst>
+              <c:ext xmlns:c16="http://schemas.microsoft.com/office/drawing/2014/chart" uri="{C3380CC4-5D6E-409C-BE32-E72D297353CC}">
+                <c16:uniqueId val="{00000007-4B27-439B-9CBD-9801A4E605C4}"/>
+              </c:ext>
+            </c:extLst>
           </c:dPt>
           <c:cat>
             <c:strRef>
@@ -1132,7 +1158,7 @@
           <a:p>
             <a:fld id="{C74DE097-FF32-41FF-AF67-9107ACEB5E7B}" type="datetimeFigureOut">
               <a:rPr lang="en-IN" smtClean="0"/>
-              <a:t>14-09-2025</a:t>
+              <a:t>20-09-2025</a:t>
             </a:fld>
             <a:endParaRPr lang="en-IN"/>
           </a:p>
@@ -1407,7 +1433,7 @@
           <a:p>
             <a:fld id="{C74DE097-FF32-41FF-AF67-9107ACEB5E7B}" type="datetimeFigureOut">
               <a:rPr lang="en-IN" smtClean="0"/>
-              <a:t>14-09-2025</a:t>
+              <a:t>20-09-2025</a:t>
             </a:fld>
             <a:endParaRPr lang="en-IN"/>
           </a:p>
@@ -1601,7 +1627,7 @@
           <a:p>
             <a:fld id="{C74DE097-FF32-41FF-AF67-9107ACEB5E7B}" type="datetimeFigureOut">
               <a:rPr lang="en-IN" smtClean="0"/>
-              <a:t>14-09-2025</a:t>
+              <a:t>20-09-2025</a:t>
             </a:fld>
             <a:endParaRPr lang="en-IN"/>
           </a:p>
@@ -1874,7 +1900,7 @@
           <a:p>
             <a:fld id="{C74DE097-FF32-41FF-AF67-9107ACEB5E7B}" type="datetimeFigureOut">
               <a:rPr lang="en-IN" smtClean="0"/>
-              <a:t>14-09-2025</a:t>
+              <a:t>20-09-2025</a:t>
             </a:fld>
             <a:endParaRPr lang="en-IN"/>
           </a:p>
@@ -2215,7 +2241,7 @@
           <a:p>
             <a:fld id="{C74DE097-FF32-41FF-AF67-9107ACEB5E7B}" type="datetimeFigureOut">
               <a:rPr lang="en-IN" smtClean="0"/>
-              <a:t>14-09-2025</a:t>
+              <a:t>20-09-2025</a:t>
             </a:fld>
             <a:endParaRPr lang="en-IN"/>
           </a:p>
@@ -2838,7 +2864,7 @@
           <a:p>
             <a:fld id="{C74DE097-FF32-41FF-AF67-9107ACEB5E7B}" type="datetimeFigureOut">
               <a:rPr lang="en-IN" smtClean="0"/>
-              <a:t>14-09-2025</a:t>
+              <a:t>20-09-2025</a:t>
             </a:fld>
             <a:endParaRPr lang="en-IN"/>
           </a:p>
@@ -3698,7 +3724,7 @@
           <a:p>
             <a:fld id="{C74DE097-FF32-41FF-AF67-9107ACEB5E7B}" type="datetimeFigureOut">
               <a:rPr lang="en-IN" smtClean="0"/>
-              <a:t>14-09-2025</a:t>
+              <a:t>20-09-2025</a:t>
             </a:fld>
             <a:endParaRPr lang="en-IN"/>
           </a:p>
@@ -3868,7 +3894,7 @@
           <a:p>
             <a:fld id="{C74DE097-FF32-41FF-AF67-9107ACEB5E7B}" type="datetimeFigureOut">
               <a:rPr lang="en-IN" smtClean="0"/>
-              <a:t>14-09-2025</a:t>
+              <a:t>20-09-2025</a:t>
             </a:fld>
             <a:endParaRPr lang="en-IN"/>
           </a:p>
@@ -4048,7 +4074,7 @@
           <a:p>
             <a:fld id="{C74DE097-FF32-41FF-AF67-9107ACEB5E7B}" type="datetimeFigureOut">
               <a:rPr lang="en-IN" smtClean="0"/>
-              <a:t>14-09-2025</a:t>
+              <a:t>20-09-2025</a:t>
             </a:fld>
             <a:endParaRPr lang="en-IN"/>
           </a:p>
@@ -4218,7 +4244,7 @@
           <a:p>
             <a:fld id="{C74DE097-FF32-41FF-AF67-9107ACEB5E7B}" type="datetimeFigureOut">
               <a:rPr lang="en-IN" smtClean="0"/>
-              <a:t>14-09-2025</a:t>
+              <a:t>20-09-2025</a:t>
             </a:fld>
             <a:endParaRPr lang="en-IN"/>
           </a:p>
@@ -4465,7 +4491,7 @@
           <a:p>
             <a:fld id="{C74DE097-FF32-41FF-AF67-9107ACEB5E7B}" type="datetimeFigureOut">
               <a:rPr lang="en-IN" smtClean="0"/>
-              <a:t>14-09-2025</a:t>
+              <a:t>20-09-2025</a:t>
             </a:fld>
             <a:endParaRPr lang="en-IN"/>
           </a:p>
@@ -4757,7 +4783,7 @@
           <a:p>
             <a:fld id="{C74DE097-FF32-41FF-AF67-9107ACEB5E7B}" type="datetimeFigureOut">
               <a:rPr lang="en-IN" smtClean="0"/>
-              <a:t>14-09-2025</a:t>
+              <a:t>20-09-2025</a:t>
             </a:fld>
             <a:endParaRPr lang="en-IN"/>
           </a:p>
@@ -5201,7 +5227,7 @@
           <a:p>
             <a:fld id="{C74DE097-FF32-41FF-AF67-9107ACEB5E7B}" type="datetimeFigureOut">
               <a:rPr lang="en-IN" smtClean="0"/>
-              <a:t>14-09-2025</a:t>
+              <a:t>20-09-2025</a:t>
             </a:fld>
             <a:endParaRPr lang="en-IN"/>
           </a:p>
@@ -5319,7 +5345,7 @@
           <a:p>
             <a:fld id="{C74DE097-FF32-41FF-AF67-9107ACEB5E7B}" type="datetimeFigureOut">
               <a:rPr lang="en-IN" smtClean="0"/>
-              <a:t>14-09-2025</a:t>
+              <a:t>20-09-2025</a:t>
             </a:fld>
             <a:endParaRPr lang="en-IN"/>
           </a:p>
@@ -5414,7 +5440,7 @@
           <a:p>
             <a:fld id="{C74DE097-FF32-41FF-AF67-9107ACEB5E7B}" type="datetimeFigureOut">
               <a:rPr lang="en-IN" smtClean="0"/>
-              <a:t>14-09-2025</a:t>
+              <a:t>20-09-2025</a:t>
             </a:fld>
             <a:endParaRPr lang="en-IN"/>
           </a:p>
@@ -5693,7 +5719,7 @@
           <a:p>
             <a:fld id="{C74DE097-FF32-41FF-AF67-9107ACEB5E7B}" type="datetimeFigureOut">
               <a:rPr lang="en-IN" smtClean="0"/>
-              <a:t>14-09-2025</a:t>
+              <a:t>20-09-2025</a:t>
             </a:fld>
             <a:endParaRPr lang="en-IN"/>
           </a:p>
@@ -5968,7 +5994,7 @@
           <a:p>
             <a:fld id="{C74DE097-FF32-41FF-AF67-9107ACEB5E7B}" type="datetimeFigureOut">
               <a:rPr lang="en-IN" smtClean="0"/>
-              <a:t>14-09-2025</a:t>
+              <a:t>20-09-2025</a:t>
             </a:fld>
             <a:endParaRPr lang="en-IN"/>
           </a:p>
@@ -6397,7 +6423,7 @@
           <a:p>
             <a:fld id="{C74DE097-FF32-41FF-AF67-9107ACEB5E7B}" type="datetimeFigureOut">
               <a:rPr lang="en-IN" smtClean="0"/>
-              <a:t>14-09-2025</a:t>
+              <a:t>20-09-2025</a:t>
             </a:fld>
             <a:endParaRPr lang="en-IN"/>
           </a:p>
@@ -6937,7 +6963,7 @@
         </p:nvSpPr>
         <p:spPr>
           <a:xfrm>
-            <a:off x="-116114" y="1447800"/>
+            <a:off x="0" y="886097"/>
             <a:ext cx="12104913" cy="3329581"/>
           </a:xfrm>
         </p:spPr>
@@ -6964,7 +6990,12 @@
             <p:ph type="subTitle" idx="1"/>
           </p:nvPr>
         </p:nvSpPr>
-        <p:spPr/>
+        <p:spPr>
+          <a:xfrm>
+            <a:off x="1639627" y="4215678"/>
+            <a:ext cx="8825658" cy="861420"/>
+          </a:xfrm>
+        </p:spPr>
         <p:txBody>
           <a:bodyPr>
             <a:normAutofit/>
@@ -7002,12 +7033,219 @@
   <p:clrMapOvr>
     <a:masterClrMapping/>
   </p:clrMapOvr>
+  <mc:AlternateContent xmlns:mc="http://schemas.openxmlformats.org/markup-compatibility/2006">
+    <mc:Choice xmlns:p14="http://schemas.microsoft.com/office/powerpoint/2010/main" Requires="p14">
+      <p:transition spd="slow" p14:dur="1500">
+        <p:split orient="vert"/>
+      </p:transition>
+    </mc:Choice>
+    <mc:Fallback>
+      <p:transition spd="slow">
+        <p:split orient="vert"/>
+      </p:transition>
+    </mc:Fallback>
+  </mc:AlternateContent>
   <p:timing>
     <p:tnLst>
       <p:par>
-        <p:cTn id="1" dur="indefinite" restart="never" nodeType="tmRoot"/>
+        <p:cTn id="1" dur="indefinite" restart="never" nodeType="tmRoot">
+          <p:childTnLst>
+            <p:seq concurrent="1" nextAc="seek">
+              <p:cTn id="2" dur="indefinite" nodeType="mainSeq">
+                <p:childTnLst>
+                  <p:par>
+                    <p:cTn id="3" fill="hold">
+                      <p:stCondLst>
+                        <p:cond delay="indefinite"/>
+                      </p:stCondLst>
+                      <p:childTnLst>
+                        <p:par>
+                          <p:cTn id="4" fill="hold">
+                            <p:stCondLst>
+                              <p:cond delay="0"/>
+                            </p:stCondLst>
+                            <p:childTnLst>
+                              <p:par>
+                                <p:cTn id="5" presetID="10" presetClass="entr" presetSubtype="0" fill="hold" grpId="0" nodeType="clickEffect">
+                                  <p:stCondLst>
+                                    <p:cond delay="0"/>
+                                  </p:stCondLst>
+                                  <p:childTnLst>
+                                    <p:set>
+                                      <p:cBhvr>
+                                        <p:cTn id="6" dur="1" fill="hold">
+                                          <p:stCondLst>
+                                            <p:cond delay="0"/>
+                                          </p:stCondLst>
+                                        </p:cTn>
+                                        <p:tgtEl>
+                                          <p:spTgt spid="2"/>
+                                        </p:tgtEl>
+                                        <p:attrNameLst>
+                                          <p:attrName>style.visibility</p:attrName>
+                                        </p:attrNameLst>
+                                      </p:cBhvr>
+                                      <p:to>
+                                        <p:strVal val="visible"/>
+                                      </p:to>
+                                    </p:set>
+                                    <p:animEffect transition="in" filter="fade">
+                                      <p:cBhvr>
+                                        <p:cTn id="7" dur="500"/>
+                                        <p:tgtEl>
+                                          <p:spTgt spid="2"/>
+                                        </p:tgtEl>
+                                      </p:cBhvr>
+                                    </p:animEffect>
+                                  </p:childTnLst>
+                                </p:cTn>
+                              </p:par>
+                            </p:childTnLst>
+                          </p:cTn>
+                        </p:par>
+                      </p:childTnLst>
+                    </p:cTn>
+                  </p:par>
+                  <p:par>
+                    <p:cTn id="8" fill="hold">
+                      <p:stCondLst>
+                        <p:cond delay="indefinite"/>
+                      </p:stCondLst>
+                      <p:childTnLst>
+                        <p:par>
+                          <p:cTn id="9" fill="hold">
+                            <p:stCondLst>
+                              <p:cond delay="0"/>
+                            </p:stCondLst>
+                            <p:childTnLst>
+                              <p:par>
+                                <p:cTn id="10" presetID="42" presetClass="entr" presetSubtype="0" fill="hold" grpId="0" nodeType="clickEffect">
+                                  <p:stCondLst>
+                                    <p:cond delay="0"/>
+                                  </p:stCondLst>
+                                  <p:childTnLst>
+                                    <p:set>
+                                      <p:cBhvr>
+                                        <p:cTn id="11" dur="1" fill="hold">
+                                          <p:stCondLst>
+                                            <p:cond delay="0"/>
+                                          </p:stCondLst>
+                                        </p:cTn>
+                                        <p:tgtEl>
+                                          <p:spTgt spid="3">
+                                            <p:txEl>
+                                              <p:pRg st="0" end="0"/>
+                                            </p:txEl>
+                                          </p:spTgt>
+                                        </p:tgtEl>
+                                        <p:attrNameLst>
+                                          <p:attrName>style.visibility</p:attrName>
+                                        </p:attrNameLst>
+                                      </p:cBhvr>
+                                      <p:to>
+                                        <p:strVal val="visible"/>
+                                      </p:to>
+                                    </p:set>
+                                    <p:animEffect transition="in" filter="fade">
+                                      <p:cBhvr>
+                                        <p:cTn id="12" dur="500"/>
+                                        <p:tgtEl>
+                                          <p:spTgt spid="3">
+                                            <p:txEl>
+                                              <p:pRg st="0" end="0"/>
+                                            </p:txEl>
+                                          </p:spTgt>
+                                        </p:tgtEl>
+                                      </p:cBhvr>
+                                    </p:animEffect>
+                                    <p:anim calcmode="lin" valueType="num">
+                                      <p:cBhvr>
+                                        <p:cTn id="13" dur="500" fill="hold"/>
+                                        <p:tgtEl>
+                                          <p:spTgt spid="3">
+                                            <p:txEl>
+                                              <p:pRg st="0" end="0"/>
+                                            </p:txEl>
+                                          </p:spTgt>
+                                        </p:tgtEl>
+                                        <p:attrNameLst>
+                                          <p:attrName>ppt_x</p:attrName>
+                                        </p:attrNameLst>
+                                      </p:cBhvr>
+                                      <p:tavLst>
+                                        <p:tav tm="0">
+                                          <p:val>
+                                            <p:strVal val="#ppt_x"/>
+                                          </p:val>
+                                        </p:tav>
+                                        <p:tav tm="100000">
+                                          <p:val>
+                                            <p:strVal val="#ppt_x"/>
+                                          </p:val>
+                                        </p:tav>
+                                      </p:tavLst>
+                                    </p:anim>
+                                    <p:anim calcmode="lin" valueType="num">
+                                      <p:cBhvr>
+                                        <p:cTn id="14" dur="500" fill="hold"/>
+                                        <p:tgtEl>
+                                          <p:spTgt spid="3">
+                                            <p:txEl>
+                                              <p:pRg st="0" end="0"/>
+                                            </p:txEl>
+                                          </p:spTgt>
+                                        </p:tgtEl>
+                                        <p:attrNameLst>
+                                          <p:attrName>ppt_y</p:attrName>
+                                        </p:attrNameLst>
+                                      </p:cBhvr>
+                                      <p:tavLst>
+                                        <p:tav tm="0">
+                                          <p:val>
+                                            <p:strVal val="#ppt_y+.1"/>
+                                          </p:val>
+                                        </p:tav>
+                                        <p:tav tm="100000">
+                                          <p:val>
+                                            <p:strVal val="#ppt_y"/>
+                                          </p:val>
+                                        </p:tav>
+                                      </p:tavLst>
+                                    </p:anim>
+                                  </p:childTnLst>
+                                </p:cTn>
+                              </p:par>
+                            </p:childTnLst>
+                          </p:cTn>
+                        </p:par>
+                      </p:childTnLst>
+                    </p:cTn>
+                  </p:par>
+                </p:childTnLst>
+              </p:cTn>
+              <p:prevCondLst>
+                <p:cond evt="onPrev" delay="0">
+                  <p:tgtEl>
+                    <p:sldTgt/>
+                  </p:tgtEl>
+                </p:cond>
+              </p:prevCondLst>
+              <p:nextCondLst>
+                <p:cond evt="onNext" delay="0">
+                  <p:tgtEl>
+                    <p:sldTgt/>
+                  </p:tgtEl>
+                </p:cond>
+              </p:nextCondLst>
+            </p:seq>
+          </p:childTnLst>
+        </p:cTn>
       </p:par>
     </p:tnLst>
+    <p:bldLst>
+      <p:bldP spid="2" grpId="0"/>
+      <p:bldP spid="3" grpId="0" build="p"/>
+    </p:bldLst>
   </p:timing>
 </p:sld>
 </file>
@@ -7105,6 +7343,18 @@
   <p:clrMapOvr>
     <a:masterClrMapping/>
   </p:clrMapOvr>
+  <mc:AlternateContent xmlns:mc="http://schemas.openxmlformats.org/markup-compatibility/2006">
+    <mc:Choice xmlns:p14="http://schemas.microsoft.com/office/powerpoint/2010/main" Requires="p14">
+      <p:transition spd="slow" p14:dur="1500">
+        <p:split orient="vert"/>
+      </p:transition>
+    </mc:Choice>
+    <mc:Fallback>
+      <p:transition spd="slow">
+        <p:split orient="vert"/>
+      </p:transition>
+    </mc:Fallback>
+  </mc:AlternateContent>
   <p:timing>
     <p:tnLst>
       <p:par>
@@ -7343,6 +7593,18 @@
   <p:clrMapOvr>
     <a:masterClrMapping/>
   </p:clrMapOvr>
+  <mc:AlternateContent xmlns:mc="http://schemas.openxmlformats.org/markup-compatibility/2006">
+    <mc:Choice xmlns:p14="http://schemas.microsoft.com/office/powerpoint/2010/main" Requires="p14">
+      <p:transition spd="slow" p14:dur="1500">
+        <p:split orient="vert"/>
+      </p:transition>
+    </mc:Choice>
+    <mc:Fallback>
+      <p:transition spd="slow">
+        <p:split orient="vert"/>
+      </p:transition>
+    </mc:Fallback>
+  </mc:AlternateContent>
   <p:timing>
     <p:tnLst>
       <p:par>
@@ -7562,6 +7824,18 @@
   <p:clrMapOvr>
     <a:masterClrMapping/>
   </p:clrMapOvr>
+  <mc:AlternateContent xmlns:mc="http://schemas.openxmlformats.org/markup-compatibility/2006">
+    <mc:Choice xmlns:p14="http://schemas.microsoft.com/office/powerpoint/2010/main" Requires="p14">
+      <p:transition spd="slow" p14:dur="1500">
+        <p:split orient="vert"/>
+      </p:transition>
+    </mc:Choice>
+    <mc:Fallback>
+      <p:transition spd="slow">
+        <p:split orient="vert"/>
+      </p:transition>
+    </mc:Fallback>
+  </mc:AlternateContent>
   <p:timing>
     <p:tnLst>
       <p:par>
@@ -7687,6 +7961,150 @@
   <p:clrMapOvr>
     <a:masterClrMapping/>
   </p:clrMapOvr>
+  <mc:AlternateContent xmlns:mc="http://schemas.openxmlformats.org/markup-compatibility/2006">
+    <mc:Choice xmlns:p14="http://schemas.microsoft.com/office/powerpoint/2010/main" Requires="p14">
+      <p:transition spd="slow" p14:dur="1500">
+        <p:split orient="vert"/>
+      </p:transition>
+    </mc:Choice>
+    <mc:Fallback>
+      <p:transition spd="slow">
+        <p:split orient="vert"/>
+      </p:transition>
+    </mc:Fallback>
+  </mc:AlternateContent>
+  <p:timing>
+    <p:tnLst>
+      <p:par>
+        <p:cTn id="1" dur="indefinite" restart="never" nodeType="tmRoot"/>
+      </p:par>
+    </p:tnLst>
+  </p:timing>
+</p:sld>
+</file>
+
+<file path=ppt/slides/slide6.xml><?xml version="1.0" encoding="utf-8"?>
+<p:sld xmlns:a="http://schemas.openxmlformats.org/drawingml/2006/main" xmlns:r="http://schemas.openxmlformats.org/officeDocument/2006/relationships" xmlns:p="http://schemas.openxmlformats.org/presentationml/2006/main">
+  <p:cSld>
+    <p:spTree>
+      <p:nvGrpSpPr>
+        <p:cNvPr id="1" name=""/>
+        <p:cNvGrpSpPr/>
+        <p:nvPr/>
+      </p:nvGrpSpPr>
+      <p:grpSpPr>
+        <a:xfrm>
+          <a:off x="0" y="0"/>
+          <a:ext cx="0" cy="0"/>
+          <a:chOff x="0" y="0"/>
+          <a:chExt cx="0" cy="0"/>
+        </a:xfrm>
+      </p:grpSpPr>
+      <p:sp>
+        <p:nvSpPr>
+          <p:cNvPr id="2" name="Title 1"/>
+          <p:cNvSpPr>
+            <a:spLocks noGrp="1"/>
+          </p:cNvSpPr>
+          <p:nvPr>
+            <p:ph type="ctrTitle"/>
+          </p:nvPr>
+        </p:nvSpPr>
+        <p:spPr>
+          <a:xfrm>
+            <a:off x="-484674" y="589867"/>
+            <a:ext cx="12104913" cy="3329581"/>
+          </a:xfrm>
+        </p:spPr>
+        <p:txBody>
+          <a:bodyPr/>
+          <a:lstStyle/>
+          <a:p>
+            <a:pPr algn="ctr"/>
+            <a:r>
+              <a:rPr lang="en-IN" b="1" dirty="0" smtClean="0">
+                <a:solidFill>
+                  <a:srgbClr val="FF0000"/>
+                </a:solidFill>
+                <a:hlinkClick r:id="rId2"/>
+              </a:rPr>
+              <a:t>WHO</a:t>
+            </a:r>
+            <a:r>
+              <a:rPr lang="en-IN" b="1" dirty="0" smtClean="0">
+                <a:hlinkClick r:id="rId2"/>
+              </a:rPr>
+              <a:t> DATA</a:t>
+            </a:r>
+            <a:endParaRPr lang="en-IN" b="1" dirty="0"/>
+          </a:p>
+        </p:txBody>
+      </p:sp>
+      <p:sp>
+        <p:nvSpPr>
+          <p:cNvPr id="3" name="Subtitle 2"/>
+          <p:cNvSpPr>
+            <a:spLocks noGrp="1"/>
+          </p:cNvSpPr>
+          <p:nvPr>
+            <p:ph type="subTitle" idx="1"/>
+          </p:nvPr>
+        </p:nvSpPr>
+        <p:spPr>
+          <a:xfrm>
+            <a:off x="1154953" y="4069976"/>
+            <a:ext cx="8825658" cy="861420"/>
+          </a:xfrm>
+        </p:spPr>
+        <p:txBody>
+          <a:bodyPr>
+            <a:normAutofit/>
+          </a:bodyPr>
+          <a:lstStyle/>
+          <a:p>
+            <a:pPr algn="ctr"/>
+            <a:r>
+              <a:rPr lang="en-IN" sz="3600" dirty="0" smtClean="0">
+                <a:solidFill>
+                  <a:schemeClr val="accent2">
+                    <a:lumMod val="75000"/>
+                  </a:schemeClr>
+                </a:solidFill>
+              </a:rPr>
+              <a:t>Click Above to read.</a:t>
+            </a:r>
+            <a:endParaRPr lang="en-IN" sz="3600" dirty="0">
+              <a:solidFill>
+                <a:schemeClr val="accent2">
+                  <a:lumMod val="75000"/>
+                </a:schemeClr>
+              </a:solidFill>
+            </a:endParaRPr>
+          </a:p>
+        </p:txBody>
+      </p:sp>
+    </p:spTree>
+    <p:extLst>
+      <p:ext uri="{BB962C8B-B14F-4D97-AF65-F5344CB8AC3E}">
+        <p14:creationId xmlns:p14="http://schemas.microsoft.com/office/powerpoint/2010/main" val="3897371946"/>
+      </p:ext>
+    </p:extLst>
+  </p:cSld>
+  <p:clrMapOvr>
+    <a:masterClrMapping/>
+  </p:clrMapOvr>
+  <mc:AlternateContent xmlns:mc="http://schemas.openxmlformats.org/markup-compatibility/2006">
+    <mc:Choice xmlns:p14="http://schemas.microsoft.com/office/powerpoint/2010/main" Requires="p14">
+      <p:transition spd="slow" p14:dur="1500">
+        <p:split orient="vert"/>
+      </p:transition>
+    </mc:Choice>
+    <mc:Fallback>
+      <p:transition spd="slow">
+        <p:split orient="vert"/>
+      </p:transition>
+    </mc:Fallback>
+  </mc:AlternateContent>
   <p:timing>
     <p:tnLst>
       <p:par>

</xml_diff>